<commit_message>
Add files for Week12, update final proj
</commit_message>
<xml_diff>
--- a/Labs/2018期末project要求.pptx
+++ b/Labs/2018期末project要求.pptx
@@ -1657,7 +1657,7 @@
           <a:p>
             <a:fld id="{1D8BD707-D9CF-40AE-B4C6-C98DA3205C09}" type="datetimeFigureOut">
               <a:rPr lang="en-US"/>
-              <a:t>5/28/2018</a:t>
+              <a:t>5/31/2018</a:t>
             </a:fld>
             <a:endParaRPr lang="en-US"/>
           </a:p>
@@ -1956,7 +1956,7 @@
           <a:p>
             <a:fld id="{1D8BD707-D9CF-40AE-B4C6-C98DA3205C09}" type="datetimeFigureOut">
               <a:rPr lang="en-US"/>
-              <a:t>5/28/2018</a:t>
+              <a:t>5/31/2018</a:t>
             </a:fld>
             <a:endParaRPr lang="en-US"/>
           </a:p>
@@ -2170,7 +2170,7 @@
           <a:p>
             <a:fld id="{1D8BD707-D9CF-40AE-B4C6-C98DA3205C09}" type="datetimeFigureOut">
               <a:rPr lang="en-US"/>
-              <a:t>5/28/2018</a:t>
+              <a:t>5/31/2018</a:t>
             </a:fld>
             <a:endParaRPr lang="en-US"/>
           </a:p>
@@ -2318,7 +2318,7 @@
           <a:p>
             <a:fld id="{1D8BD707-D9CF-40AE-B4C6-C98DA3205C09}" type="datetimeFigureOut">
               <a:rPr lang="en-US"/>
-              <a:t>5/28/2018</a:t>
+              <a:t>5/31/2018</a:t>
             </a:fld>
             <a:endParaRPr lang="en-US"/>
           </a:p>
@@ -2437,7 +2437,7 @@
           <a:p>
             <a:fld id="{1D8BD707-D9CF-40AE-B4C6-C98DA3205C09}" type="datetimeFigureOut">
               <a:rPr lang="en-US"/>
-              <a:t>5/28/2018</a:t>
+              <a:t>5/31/2018</a:t>
             </a:fld>
             <a:endParaRPr lang="en-US"/>
           </a:p>
@@ -2689,7 +2689,7 @@
           <a:p>
             <a:fld id="{1D8BD707-D9CF-40AE-B4C6-C98DA3205C09}" type="datetimeFigureOut">
               <a:rPr lang="en-US"/>
-              <a:t>5/28/2018</a:t>
+              <a:t>5/31/2018</a:t>
             </a:fld>
             <a:endParaRPr lang="en-US"/>
           </a:p>
@@ -4703,6 +4703,26 @@
               <a:t>：（</a:t>
             </a:r>
             <a:r>
+              <a:rPr lang="en-US" altLang="zh-CN" sz="2400" spc="-35" dirty="0">
+                <a:solidFill>
+                  <a:srgbClr val="FFFFFF"/>
+                </a:solidFill>
+                <a:latin typeface="Trebuchet MS"/>
+                <a:cs typeface="Noto Sans Mono CJK JP Regular"/>
+              </a:rPr>
+              <a:t>18</a:t>
+            </a:r>
+            <a:r>
+              <a:rPr lang="zh-CN" altLang="en-US" sz="2400" spc="-35" dirty="0">
+                <a:solidFill>
+                  <a:srgbClr val="FFFFFF"/>
+                </a:solidFill>
+                <a:latin typeface="Trebuchet MS"/>
+                <a:cs typeface="Noto Sans Mono CJK JP Regular"/>
+              </a:rPr>
+              <a:t>周</a:t>
+            </a:r>
+            <a:r>
               <a:rPr lang="zh-CN" altLang="en-US" sz="2400" spc="-35" dirty="0">
                 <a:solidFill>
                   <a:srgbClr val="FFFFFF"/>
@@ -4710,7 +4730,7 @@
                 <a:latin typeface="Trebuchet MS"/>
                 <a:cs typeface="Trebuchet MS"/>
               </a:rPr>
-              <a:t>待定）</a:t>
+              <a:t>）</a:t>
             </a:r>
             <a:r>
               <a:rPr sz="2400" dirty="0" err="1">
@@ -4806,7 +4826,51 @@
                 <a:cs typeface="Noto Sans Mono CJK JP Regular"/>
                 <a:sym typeface="Wingdings" panose="05000000000000000000" pitchFamily="2" charset="2"/>
               </a:rPr>
-              <a:t>：（待定）</a:t>
+              <a:t>：（</a:t>
+            </a:r>
+            <a:r>
+              <a:rPr lang="en-US" altLang="zh-CN" sz="2400" spc="-35" dirty="0">
+                <a:solidFill>
+                  <a:srgbClr val="FFFFFF"/>
+                </a:solidFill>
+                <a:latin typeface="Noto Sans Mono CJK JP Regular"/>
+                <a:cs typeface="Noto Sans Mono CJK JP Regular"/>
+                <a:sym typeface="Wingdings" panose="05000000000000000000" pitchFamily="2" charset="2"/>
+              </a:rPr>
+              <a:t>20</a:t>
+            </a:r>
+            <a:r>
+              <a:rPr lang="zh-CN" altLang="en-US" sz="2400" spc="-35" dirty="0">
+                <a:solidFill>
+                  <a:srgbClr val="FFFFFF"/>
+                </a:solidFill>
+                <a:latin typeface="Noto Sans Mono CJK JP Regular"/>
+                <a:cs typeface="Noto Sans Mono CJK JP Regular"/>
+                <a:sym typeface="Wingdings" panose="05000000000000000000" pitchFamily="2" charset="2"/>
+              </a:rPr>
+              <a:t>周周日</a:t>
+            </a:r>
+            <a:r>
+              <a:rPr lang="en-US" altLang="zh-CN" sz="2400" spc="-35" dirty="0">
+                <a:solidFill>
+                  <a:srgbClr val="FFFFFF"/>
+                </a:solidFill>
+                <a:latin typeface="Noto Sans Mono CJK JP Regular"/>
+                <a:cs typeface="Noto Sans Mono CJK JP Regular"/>
+                <a:sym typeface="Wingdings" panose="05000000000000000000" pitchFamily="2" charset="2"/>
+              </a:rPr>
+              <a:t>23:59</a:t>
+            </a:r>
+            <a:r>
+              <a:rPr lang="zh-CN" altLang="en-US" sz="2400" spc="-35" dirty="0">
+                <a:solidFill>
+                  <a:srgbClr val="FFFFFF"/>
+                </a:solidFill>
+                <a:latin typeface="Noto Sans Mono CJK JP Regular"/>
+                <a:cs typeface="Noto Sans Mono CJK JP Regular"/>
+                <a:sym typeface="Wingdings" panose="05000000000000000000" pitchFamily="2" charset="2"/>
+              </a:rPr>
+              <a:t>）</a:t>
             </a:r>
             <a:endParaRPr sz="2400" dirty="0">
               <a:latin typeface="Noto Sans Mono CJK JP Regular"/>

</xml_diff>